<commit_message>
Rearranged framework.tex (Boeing section) to move aircraft description first. General edits to challenges.tex Changes to rta-arch.jpg to align with text.
</commit_message>
<xml_diff>
--- a/figures/figures.pptx
+++ b/figures/figures.pptx
@@ -6,9 +6,10 @@
   </p:sldMasterIdLst>
   <p:sldIdLst>
     <p:sldId id="2126987317" r:id="rId2"/>
-    <p:sldId id="2126987318" r:id="rId3"/>
-    <p:sldId id="2126987320" r:id="rId4"/>
-    <p:sldId id="2126987321" r:id="rId5"/>
+    <p:sldId id="2126987322" r:id="rId3"/>
+    <p:sldId id="2126987318" r:id="rId4"/>
+    <p:sldId id="2126987320" r:id="rId5"/>
+    <p:sldId id="2126987321" r:id="rId6"/>
   </p:sldIdLst>
   <p:sldSz cx="12192000" cy="6858000"/>
   <p:notesSz cx="6858000" cy="9144000"/>
@@ -107,6 +108,11 @@
       </a:defRPr>
     </a:lvl9pPr>
   </p:defaultTextStyle>
+  <p:extLst>
+    <p:ext uri="{EFAFB233-063F-42B5-8137-9DF3F51BA10A}">
+      <p15:sldGuideLst xmlns:p15="http://schemas.microsoft.com/office/powerpoint/2012/main"/>
+    </p:ext>
+  </p:extLst>
 </p:presentation>
 </file>
 
@@ -257,7 +263,7 @@
           <a:p>
             <a:fld id="{105E4FE3-D30E-4191-8E04-3160D200CB1D}" type="datetimeFigureOut">
               <a:rPr lang="en-US" smtClean="0"/>
-              <a:t>4/18/2022</a:t>
+              <a:t>4/27/2022</a:t>
             </a:fld>
             <a:endParaRPr lang="en-US"/>
           </a:p>
@@ -455,7 +461,7 @@
           <a:p>
             <a:fld id="{105E4FE3-D30E-4191-8E04-3160D200CB1D}" type="datetimeFigureOut">
               <a:rPr lang="en-US" smtClean="0"/>
-              <a:t>4/18/2022</a:t>
+              <a:t>4/27/2022</a:t>
             </a:fld>
             <a:endParaRPr lang="en-US"/>
           </a:p>
@@ -663,7 +669,7 @@
           <a:p>
             <a:fld id="{105E4FE3-D30E-4191-8E04-3160D200CB1D}" type="datetimeFigureOut">
               <a:rPr lang="en-US" smtClean="0"/>
-              <a:t>4/18/2022</a:t>
+              <a:t>4/27/2022</a:t>
             </a:fld>
             <a:endParaRPr lang="en-US"/>
           </a:p>
@@ -1516,7 +1522,7 @@
           <a:p>
             <a:fld id="{105E4FE3-D30E-4191-8E04-3160D200CB1D}" type="datetimeFigureOut">
               <a:rPr lang="en-US" smtClean="0"/>
-              <a:t>4/18/2022</a:t>
+              <a:t>4/27/2022</a:t>
             </a:fld>
             <a:endParaRPr lang="en-US"/>
           </a:p>
@@ -1791,7 +1797,7 @@
           <a:p>
             <a:fld id="{105E4FE3-D30E-4191-8E04-3160D200CB1D}" type="datetimeFigureOut">
               <a:rPr lang="en-US" smtClean="0"/>
-              <a:t>4/18/2022</a:t>
+              <a:t>4/27/2022</a:t>
             </a:fld>
             <a:endParaRPr lang="en-US"/>
           </a:p>
@@ -2056,7 +2062,7 @@
           <a:p>
             <a:fld id="{105E4FE3-D30E-4191-8E04-3160D200CB1D}" type="datetimeFigureOut">
               <a:rPr lang="en-US" smtClean="0"/>
-              <a:t>4/18/2022</a:t>
+              <a:t>4/27/2022</a:t>
             </a:fld>
             <a:endParaRPr lang="en-US"/>
           </a:p>
@@ -2468,7 +2474,7 @@
           <a:p>
             <a:fld id="{105E4FE3-D30E-4191-8E04-3160D200CB1D}" type="datetimeFigureOut">
               <a:rPr lang="en-US" smtClean="0"/>
-              <a:t>4/18/2022</a:t>
+              <a:t>4/27/2022</a:t>
             </a:fld>
             <a:endParaRPr lang="en-US"/>
           </a:p>
@@ -2609,7 +2615,7 @@
           <a:p>
             <a:fld id="{105E4FE3-D30E-4191-8E04-3160D200CB1D}" type="datetimeFigureOut">
               <a:rPr lang="en-US" smtClean="0"/>
-              <a:t>4/18/2022</a:t>
+              <a:t>4/27/2022</a:t>
             </a:fld>
             <a:endParaRPr lang="en-US"/>
           </a:p>
@@ -2722,7 +2728,7 @@
           <a:p>
             <a:fld id="{105E4FE3-D30E-4191-8E04-3160D200CB1D}" type="datetimeFigureOut">
               <a:rPr lang="en-US" smtClean="0"/>
-              <a:t>4/18/2022</a:t>
+              <a:t>4/27/2022</a:t>
             </a:fld>
             <a:endParaRPr lang="en-US"/>
           </a:p>
@@ -3033,7 +3039,7 @@
           <a:p>
             <a:fld id="{105E4FE3-D30E-4191-8E04-3160D200CB1D}" type="datetimeFigureOut">
               <a:rPr lang="en-US" smtClean="0"/>
-              <a:t>4/18/2022</a:t>
+              <a:t>4/27/2022</a:t>
             </a:fld>
             <a:endParaRPr lang="en-US"/>
           </a:p>
@@ -3321,7 +3327,7 @@
           <a:p>
             <a:fld id="{105E4FE3-D30E-4191-8E04-3160D200CB1D}" type="datetimeFigureOut">
               <a:rPr lang="en-US" smtClean="0"/>
-              <a:t>4/18/2022</a:t>
+              <a:t>4/27/2022</a:t>
             </a:fld>
             <a:endParaRPr lang="en-US"/>
           </a:p>
@@ -3562,7 +3568,7 @@
           <a:p>
             <a:fld id="{105E4FE3-D30E-4191-8E04-3160D200CB1D}" type="datetimeFigureOut">
               <a:rPr lang="en-US" smtClean="0"/>
-              <a:t>4/18/2022</a:t>
+              <a:t>4/27/2022</a:t>
             </a:fld>
             <a:endParaRPr lang="en-US"/>
           </a:p>
@@ -6583,6 +6589,2287 @@
           <a:chExt cx="0" cy="0"/>
         </a:xfrm>
       </p:grpSpPr>
+      <p:sp>
+        <p:nvSpPr>
+          <p:cNvPr id="24" name="Rectangle 23">
+            <a:extLst>
+              <a:ext uri="{FF2B5EF4-FFF2-40B4-BE49-F238E27FC236}">
+                <a16:creationId xmlns:a16="http://schemas.microsoft.com/office/drawing/2014/main" id="{D32B402B-FDFB-47D7-9DB4-94B5C3024A46}"/>
+              </a:ext>
+            </a:extLst>
+          </p:cNvPr>
+          <p:cNvSpPr/>
+          <p:nvPr/>
+        </p:nvSpPr>
+        <p:spPr>
+          <a:xfrm>
+            <a:off x="3855026" y="1959358"/>
+            <a:ext cx="4125495" cy="3614795"/>
+          </a:xfrm>
+          <a:prstGeom prst="rect">
+            <a:avLst/>
+          </a:prstGeom>
+          <a:solidFill>
+            <a:srgbClr val="CCFFCC"/>
+          </a:solidFill>
+          <a:ln w="19050">
+            <a:solidFill>
+              <a:schemeClr val="tx1"/>
+            </a:solidFill>
+            <a:prstDash val="dash"/>
+          </a:ln>
+          <a:effectLst/>
+        </p:spPr>
+        <p:style>
+          <a:lnRef idx="1">
+            <a:schemeClr val="accent1"/>
+          </a:lnRef>
+          <a:fillRef idx="3">
+            <a:schemeClr val="accent1"/>
+          </a:fillRef>
+          <a:effectRef idx="2">
+            <a:schemeClr val="accent1"/>
+          </a:effectRef>
+          <a:fontRef idx="minor">
+            <a:schemeClr val="lt1"/>
+          </a:fontRef>
+        </p:style>
+        <p:txBody>
+          <a:bodyPr rtlCol="0" anchor="t"/>
+          <a:lstStyle/>
+          <a:p>
+            <a:pPr algn="r"/>
+            <a:r>
+              <a:rPr lang="en-US" sz="1100" dirty="0">
+                <a:solidFill>
+                  <a:schemeClr val="tx1"/>
+                </a:solidFill>
+                <a:cs typeface="Arial" panose="020B0604020202020204" pitchFamily="34" charset="0"/>
+              </a:rPr>
+              <a:t>Run-Time Assurance</a:t>
+            </a:r>
+          </a:p>
+        </p:txBody>
+      </p:sp>
+      <p:sp>
+        <p:nvSpPr>
+          <p:cNvPr id="9" name="Rectangle 8">
+            <a:extLst>
+              <a:ext uri="{FF2B5EF4-FFF2-40B4-BE49-F238E27FC236}">
+                <a16:creationId xmlns:a16="http://schemas.microsoft.com/office/drawing/2014/main" id="{3D6D7FBC-612C-4178-8A11-8E16AC29B898}"/>
+              </a:ext>
+            </a:extLst>
+          </p:cNvPr>
+          <p:cNvSpPr/>
+          <p:nvPr/>
+        </p:nvSpPr>
+        <p:spPr>
+          <a:xfrm>
+            <a:off x="636989" y="1430521"/>
+            <a:ext cx="989137" cy="626780"/>
+          </a:xfrm>
+          <a:prstGeom prst="rect">
+            <a:avLst/>
+          </a:prstGeom>
+          <a:noFill/>
+          <a:ln w="19050">
+            <a:solidFill>
+              <a:schemeClr val="tx1"/>
+            </a:solidFill>
+          </a:ln>
+          <a:effectLst/>
+        </p:spPr>
+        <p:style>
+          <a:lnRef idx="1">
+            <a:schemeClr val="accent1"/>
+          </a:lnRef>
+          <a:fillRef idx="3">
+            <a:schemeClr val="accent1"/>
+          </a:fillRef>
+          <a:effectRef idx="2">
+            <a:schemeClr val="accent1"/>
+          </a:effectRef>
+          <a:fontRef idx="minor">
+            <a:schemeClr val="lt1"/>
+          </a:fontRef>
+        </p:style>
+        <p:txBody>
+          <a:bodyPr rtlCol="0" anchor="ctr"/>
+          <a:lstStyle/>
+          <a:p>
+            <a:pPr algn="ctr"/>
+            <a:r>
+              <a:rPr lang="en-US" sz="1100" dirty="0">
+                <a:solidFill>
+                  <a:schemeClr val="tx1"/>
+                </a:solidFill>
+              </a:rPr>
+              <a:t>ADS-B</a:t>
+            </a:r>
+          </a:p>
+        </p:txBody>
+      </p:sp>
+      <p:sp>
+        <p:nvSpPr>
+          <p:cNvPr id="14" name="Rectangle 13">
+            <a:extLst>
+              <a:ext uri="{FF2B5EF4-FFF2-40B4-BE49-F238E27FC236}">
+                <a16:creationId xmlns:a16="http://schemas.microsoft.com/office/drawing/2014/main" id="{3274BD7D-74D3-4A1C-A239-8F40AD294416}"/>
+              </a:ext>
+            </a:extLst>
+          </p:cNvPr>
+          <p:cNvSpPr/>
+          <p:nvPr/>
+        </p:nvSpPr>
+        <p:spPr>
+          <a:xfrm>
+            <a:off x="636989" y="4819915"/>
+            <a:ext cx="989137" cy="626780"/>
+          </a:xfrm>
+          <a:prstGeom prst="rect">
+            <a:avLst/>
+          </a:prstGeom>
+          <a:noFill/>
+          <a:ln w="19050">
+            <a:solidFill>
+              <a:schemeClr val="tx1"/>
+            </a:solidFill>
+          </a:ln>
+          <a:effectLst/>
+        </p:spPr>
+        <p:style>
+          <a:lnRef idx="1">
+            <a:schemeClr val="accent1"/>
+          </a:lnRef>
+          <a:fillRef idx="3">
+            <a:schemeClr val="accent1"/>
+          </a:fillRef>
+          <a:effectRef idx="2">
+            <a:schemeClr val="accent1"/>
+          </a:effectRef>
+          <a:fontRef idx="minor">
+            <a:schemeClr val="lt1"/>
+          </a:fontRef>
+        </p:style>
+        <p:txBody>
+          <a:bodyPr rtlCol="0" anchor="ctr"/>
+          <a:lstStyle/>
+          <a:p>
+            <a:pPr algn="ctr"/>
+            <a:r>
+              <a:rPr lang="en-US" sz="1100" dirty="0">
+                <a:solidFill>
+                  <a:schemeClr val="tx1"/>
+                </a:solidFill>
+              </a:rPr>
+              <a:t>Avoidance Alert</a:t>
+            </a:r>
+          </a:p>
+        </p:txBody>
+      </p:sp>
+      <p:sp>
+        <p:nvSpPr>
+          <p:cNvPr id="15" name="Rectangle 14">
+            <a:extLst>
+              <a:ext uri="{FF2B5EF4-FFF2-40B4-BE49-F238E27FC236}">
+                <a16:creationId xmlns:a16="http://schemas.microsoft.com/office/drawing/2014/main" id="{D7289FB9-1E7D-4AE2-A46C-62F5B2846AC4}"/>
+              </a:ext>
+            </a:extLst>
+          </p:cNvPr>
+          <p:cNvSpPr/>
+          <p:nvPr/>
+        </p:nvSpPr>
+        <p:spPr>
+          <a:xfrm>
+            <a:off x="2629300" y="3969465"/>
+            <a:ext cx="989137" cy="626780"/>
+          </a:xfrm>
+          <a:prstGeom prst="rect">
+            <a:avLst/>
+          </a:prstGeom>
+          <a:solidFill>
+            <a:srgbClr val="FFC000"/>
+          </a:solidFill>
+          <a:ln w="19050">
+            <a:solidFill>
+              <a:schemeClr val="tx1"/>
+            </a:solidFill>
+          </a:ln>
+          <a:effectLst/>
+        </p:spPr>
+        <p:style>
+          <a:lnRef idx="1">
+            <a:schemeClr val="accent1"/>
+          </a:lnRef>
+          <a:fillRef idx="3">
+            <a:schemeClr val="accent1"/>
+          </a:fillRef>
+          <a:effectRef idx="2">
+            <a:schemeClr val="accent1"/>
+          </a:effectRef>
+          <a:fontRef idx="minor">
+            <a:schemeClr val="lt1"/>
+          </a:fontRef>
+        </p:style>
+        <p:txBody>
+          <a:bodyPr rtlCol="0" anchor="ctr"/>
+          <a:lstStyle/>
+          <a:p>
+            <a:pPr algn="ctr"/>
+            <a:r>
+              <a:rPr lang="en-US" sz="1050" dirty="0">
+                <a:solidFill>
+                  <a:schemeClr val="tx1"/>
+                </a:solidFill>
+              </a:rPr>
+              <a:t>LEC</a:t>
+            </a:r>
+          </a:p>
+          <a:p>
+            <a:pPr algn="ctr"/>
+            <a:r>
+              <a:rPr lang="en-US" sz="1050" dirty="0">
+                <a:solidFill>
+                  <a:schemeClr val="tx1"/>
+                </a:solidFill>
+              </a:rPr>
+              <a:t>Planner</a:t>
+            </a:r>
+          </a:p>
+        </p:txBody>
+      </p:sp>
+      <p:sp>
+        <p:nvSpPr>
+          <p:cNvPr id="16" name="Rectangle 15">
+            <a:extLst>
+              <a:ext uri="{FF2B5EF4-FFF2-40B4-BE49-F238E27FC236}">
+                <a16:creationId xmlns:a16="http://schemas.microsoft.com/office/drawing/2014/main" id="{BA7A7FAD-D689-4249-BE57-795A4D4D4674}"/>
+              </a:ext>
+            </a:extLst>
+          </p:cNvPr>
+          <p:cNvSpPr/>
+          <p:nvPr/>
+        </p:nvSpPr>
+        <p:spPr>
+          <a:xfrm>
+            <a:off x="2629300" y="4820067"/>
+            <a:ext cx="989137" cy="626780"/>
+          </a:xfrm>
+          <a:prstGeom prst="rect">
+            <a:avLst/>
+          </a:prstGeom>
+          <a:noFill/>
+          <a:ln w="19050">
+            <a:solidFill>
+              <a:schemeClr val="tx1"/>
+            </a:solidFill>
+          </a:ln>
+          <a:effectLst/>
+        </p:spPr>
+        <p:style>
+          <a:lnRef idx="1">
+            <a:schemeClr val="accent1"/>
+          </a:lnRef>
+          <a:fillRef idx="3">
+            <a:schemeClr val="accent1"/>
+          </a:fillRef>
+          <a:effectRef idx="2">
+            <a:schemeClr val="accent1"/>
+          </a:effectRef>
+          <a:fontRef idx="minor">
+            <a:schemeClr val="lt1"/>
+          </a:fontRef>
+        </p:style>
+        <p:txBody>
+          <a:bodyPr rtlCol="0" anchor="ctr"/>
+          <a:lstStyle/>
+          <a:p>
+            <a:pPr algn="ctr"/>
+            <a:r>
+              <a:rPr lang="en-US" sz="1100" dirty="0">
+                <a:solidFill>
+                  <a:schemeClr val="tx1"/>
+                </a:solidFill>
+              </a:rPr>
+              <a:t>Backup Avoidance Planner</a:t>
+            </a:r>
+          </a:p>
+        </p:txBody>
+      </p:sp>
+      <p:sp>
+        <p:nvSpPr>
+          <p:cNvPr id="17" name="Rectangle 16">
+            <a:extLst>
+              <a:ext uri="{FF2B5EF4-FFF2-40B4-BE49-F238E27FC236}">
+                <a16:creationId xmlns:a16="http://schemas.microsoft.com/office/drawing/2014/main" id="{34530156-2E19-4864-A7FA-36BA7D9E05A8}"/>
+              </a:ext>
+            </a:extLst>
+          </p:cNvPr>
+          <p:cNvSpPr/>
+          <p:nvPr/>
+        </p:nvSpPr>
+        <p:spPr>
+          <a:xfrm>
+            <a:off x="10510213" y="4061538"/>
+            <a:ext cx="1199700" cy="1361287"/>
+          </a:xfrm>
+          <a:prstGeom prst="rect">
+            <a:avLst/>
+          </a:prstGeom>
+          <a:solidFill>
+            <a:schemeClr val="bg1">
+              <a:lumMod val="85000"/>
+            </a:schemeClr>
+          </a:solidFill>
+          <a:ln w="19050">
+            <a:solidFill>
+              <a:schemeClr val="tx1"/>
+            </a:solidFill>
+          </a:ln>
+          <a:effectLst/>
+        </p:spPr>
+        <p:style>
+          <a:lnRef idx="1">
+            <a:schemeClr val="accent1"/>
+          </a:lnRef>
+          <a:fillRef idx="3">
+            <a:schemeClr val="accent1"/>
+          </a:fillRef>
+          <a:effectRef idx="2">
+            <a:schemeClr val="accent1"/>
+          </a:effectRef>
+          <a:fontRef idx="minor">
+            <a:schemeClr val="lt1"/>
+          </a:fontRef>
+        </p:style>
+        <p:txBody>
+          <a:bodyPr rtlCol="0" anchor="ctr"/>
+          <a:lstStyle/>
+          <a:p>
+            <a:pPr algn="ctr"/>
+            <a:r>
+              <a:rPr lang="en-US" sz="1100" dirty="0">
+                <a:solidFill>
+                  <a:schemeClr val="tx1"/>
+                </a:solidFill>
+              </a:rPr>
+              <a:t>Test Aircraft</a:t>
+            </a:r>
+          </a:p>
+          <a:p>
+            <a:pPr algn="ctr"/>
+            <a:r>
+              <a:rPr lang="en-US" sz="1100" dirty="0">
+                <a:solidFill>
+                  <a:schemeClr val="tx1"/>
+                </a:solidFill>
+              </a:rPr>
+              <a:t>(Own ship) </a:t>
+            </a:r>
+          </a:p>
+          <a:p>
+            <a:pPr algn="ctr"/>
+            <a:endParaRPr lang="en-US" sz="1100" dirty="0">
+              <a:solidFill>
+                <a:schemeClr val="tx1"/>
+              </a:solidFill>
+            </a:endParaRPr>
+          </a:p>
+        </p:txBody>
+      </p:sp>
+      <p:cxnSp>
+        <p:nvCxnSpPr>
+          <p:cNvPr id="22" name="Straight Arrow Connector 21">
+            <a:extLst>
+              <a:ext uri="{FF2B5EF4-FFF2-40B4-BE49-F238E27FC236}">
+                <a16:creationId xmlns:a16="http://schemas.microsoft.com/office/drawing/2014/main" id="{EAB2A6FC-3843-49CE-88C5-DEBAB5FD9BDB}"/>
+              </a:ext>
+            </a:extLst>
+          </p:cNvPr>
+          <p:cNvCxnSpPr>
+            <a:cxnSpLocks/>
+            <a:stCxn id="15" idx="3"/>
+          </p:cNvCxnSpPr>
+          <p:nvPr/>
+        </p:nvCxnSpPr>
+        <p:spPr>
+          <a:xfrm>
+            <a:off x="3618437" y="4282855"/>
+            <a:ext cx="3219522" cy="0"/>
+          </a:xfrm>
+          <a:prstGeom prst="straightConnector1">
+            <a:avLst/>
+          </a:prstGeom>
+          <a:ln w="19050">
+            <a:solidFill>
+              <a:schemeClr val="tx1"/>
+            </a:solidFill>
+            <a:headEnd type="none" w="med" len="med"/>
+            <a:tailEnd type="arrow" w="med" len="med"/>
+          </a:ln>
+          <a:effectLst/>
+        </p:spPr>
+        <p:style>
+          <a:lnRef idx="2">
+            <a:schemeClr val="accent1"/>
+          </a:lnRef>
+          <a:fillRef idx="0">
+            <a:schemeClr val="accent1"/>
+          </a:fillRef>
+          <a:effectRef idx="1">
+            <a:schemeClr val="accent1"/>
+          </a:effectRef>
+          <a:fontRef idx="minor">
+            <a:schemeClr val="tx1"/>
+          </a:fontRef>
+        </p:style>
+      </p:cxnSp>
+      <p:cxnSp>
+        <p:nvCxnSpPr>
+          <p:cNvPr id="23" name="Straight Arrow Connector 22">
+            <a:extLst>
+              <a:ext uri="{FF2B5EF4-FFF2-40B4-BE49-F238E27FC236}">
+                <a16:creationId xmlns:a16="http://schemas.microsoft.com/office/drawing/2014/main" id="{A4039090-8BA6-4D60-8B72-2DA632F11105}"/>
+              </a:ext>
+            </a:extLst>
+          </p:cNvPr>
+          <p:cNvCxnSpPr>
+            <a:cxnSpLocks/>
+            <a:stCxn id="16" idx="3"/>
+          </p:cNvCxnSpPr>
+          <p:nvPr/>
+        </p:nvCxnSpPr>
+        <p:spPr>
+          <a:xfrm>
+            <a:off x="3618437" y="5133457"/>
+            <a:ext cx="3219522" cy="0"/>
+          </a:xfrm>
+          <a:prstGeom prst="straightConnector1">
+            <a:avLst/>
+          </a:prstGeom>
+          <a:ln w="19050">
+            <a:solidFill>
+              <a:schemeClr val="tx1"/>
+            </a:solidFill>
+            <a:headEnd type="none" w="med" len="med"/>
+            <a:tailEnd type="arrow" w="med" len="med"/>
+          </a:ln>
+          <a:effectLst/>
+        </p:spPr>
+        <p:style>
+          <a:lnRef idx="2">
+            <a:schemeClr val="accent1"/>
+          </a:lnRef>
+          <a:fillRef idx="0">
+            <a:schemeClr val="accent1"/>
+          </a:fillRef>
+          <a:effectRef idx="1">
+            <a:schemeClr val="accent1"/>
+          </a:effectRef>
+          <a:fontRef idx="minor">
+            <a:schemeClr val="tx1"/>
+          </a:fontRef>
+        </p:style>
+      </p:cxnSp>
+      <p:cxnSp>
+        <p:nvCxnSpPr>
+          <p:cNvPr id="25" name="Straight Arrow Connector 24">
+            <a:extLst>
+              <a:ext uri="{FF2B5EF4-FFF2-40B4-BE49-F238E27FC236}">
+                <a16:creationId xmlns:a16="http://schemas.microsoft.com/office/drawing/2014/main" id="{69F0E020-B9F4-48DA-89DD-708C2A3D780F}"/>
+              </a:ext>
+            </a:extLst>
+          </p:cNvPr>
+          <p:cNvCxnSpPr>
+            <a:stCxn id="9" idx="2"/>
+            <a:endCxn id="14" idx="0"/>
+          </p:cNvCxnSpPr>
+          <p:nvPr/>
+        </p:nvCxnSpPr>
+        <p:spPr>
+          <a:xfrm>
+            <a:off x="1131558" y="2057301"/>
+            <a:ext cx="0" cy="2762614"/>
+          </a:xfrm>
+          <a:prstGeom prst="straightConnector1">
+            <a:avLst/>
+          </a:prstGeom>
+          <a:ln w="19050">
+            <a:solidFill>
+              <a:schemeClr val="tx1"/>
+            </a:solidFill>
+            <a:headEnd type="none" w="med" len="med"/>
+            <a:tailEnd type="arrow" w="med" len="med"/>
+          </a:ln>
+          <a:effectLst/>
+        </p:spPr>
+        <p:style>
+          <a:lnRef idx="2">
+            <a:schemeClr val="accent1"/>
+          </a:lnRef>
+          <a:fillRef idx="0">
+            <a:schemeClr val="accent1"/>
+          </a:fillRef>
+          <a:effectRef idx="1">
+            <a:schemeClr val="accent1"/>
+          </a:effectRef>
+          <a:fontRef idx="minor">
+            <a:schemeClr val="tx1"/>
+          </a:fontRef>
+        </p:style>
+      </p:cxnSp>
+      <p:sp>
+        <p:nvSpPr>
+          <p:cNvPr id="27" name="TextBox 26">
+            <a:extLst>
+              <a:ext uri="{FF2B5EF4-FFF2-40B4-BE49-F238E27FC236}">
+                <a16:creationId xmlns:a16="http://schemas.microsoft.com/office/drawing/2014/main" id="{681229F7-1595-4DFF-8471-33153850EA34}"/>
+              </a:ext>
+            </a:extLst>
+          </p:cNvPr>
+          <p:cNvSpPr txBox="1"/>
+          <p:nvPr/>
+        </p:nvSpPr>
+        <p:spPr>
+          <a:xfrm>
+            <a:off x="1637329" y="4893604"/>
+            <a:ext cx="447558" cy="246221"/>
+          </a:xfrm>
+          <a:prstGeom prst="rect">
+            <a:avLst/>
+          </a:prstGeom>
+          <a:noFill/>
+        </p:spPr>
+        <p:txBody>
+          <a:bodyPr wrap="none" rtlCol="0">
+            <a:spAutoFit/>
+          </a:bodyPr>
+          <a:lstStyle/>
+          <a:p>
+            <a:pPr algn="l"/>
+            <a:r>
+              <a:rPr lang="en-US" sz="1000" dirty="0">
+                <a:cs typeface="Arial" panose="020B0604020202020204" pitchFamily="34" charset="0"/>
+              </a:rPr>
+              <a:t>Alert</a:t>
+            </a:r>
+            <a:endParaRPr lang="en-US" sz="900" dirty="0">
+              <a:cs typeface="Arial" panose="020B0604020202020204" pitchFamily="34" charset="0"/>
+            </a:endParaRPr>
+          </a:p>
+        </p:txBody>
+      </p:sp>
+      <p:sp>
+        <p:nvSpPr>
+          <p:cNvPr id="33" name="TextBox 32">
+            <a:extLst>
+              <a:ext uri="{FF2B5EF4-FFF2-40B4-BE49-F238E27FC236}">
+                <a16:creationId xmlns:a16="http://schemas.microsoft.com/office/drawing/2014/main" id="{AA830B82-3A2A-41DA-9DAA-9F681640DFB4}"/>
+              </a:ext>
+            </a:extLst>
+          </p:cNvPr>
+          <p:cNvSpPr txBox="1"/>
+          <p:nvPr/>
+        </p:nvSpPr>
+        <p:spPr>
+          <a:xfrm>
+            <a:off x="5418448" y="4057296"/>
+            <a:ext cx="1192955" cy="246221"/>
+          </a:xfrm>
+          <a:prstGeom prst="rect">
+            <a:avLst/>
+          </a:prstGeom>
+          <a:noFill/>
+        </p:spPr>
+        <p:txBody>
+          <a:bodyPr wrap="none" rtlCol="0">
+            <a:spAutoFit/>
+          </a:bodyPr>
+          <a:lstStyle/>
+          <a:p>
+            <a:pPr algn="l"/>
+            <a:r>
+              <a:rPr lang="en-US" sz="1000" dirty="0">
+                <a:cs typeface="Arial" panose="020B0604020202020204" pitchFamily="34" charset="0"/>
+              </a:rPr>
+              <a:t>LEC Avoidance </a:t>
+            </a:r>
+            <a:r>
+              <a:rPr lang="en-US" sz="1000" dirty="0"/>
+              <a:t>Plan</a:t>
+            </a:r>
+            <a:endParaRPr lang="en-US" sz="1000" dirty="0">
+              <a:cs typeface="Arial" panose="020B0604020202020204" pitchFamily="34" charset="0"/>
+            </a:endParaRPr>
+          </a:p>
+        </p:txBody>
+      </p:sp>
+      <p:sp>
+        <p:nvSpPr>
+          <p:cNvPr id="34" name="TextBox 33">
+            <a:extLst>
+              <a:ext uri="{FF2B5EF4-FFF2-40B4-BE49-F238E27FC236}">
+                <a16:creationId xmlns:a16="http://schemas.microsoft.com/office/drawing/2014/main" id="{845C4E6A-ABAC-405C-A17E-627D2C33F3BA}"/>
+              </a:ext>
+            </a:extLst>
+          </p:cNvPr>
+          <p:cNvSpPr txBox="1"/>
+          <p:nvPr/>
+        </p:nvSpPr>
+        <p:spPr>
+          <a:xfrm>
+            <a:off x="5418448" y="4889956"/>
+            <a:ext cx="1217000" cy="246221"/>
+          </a:xfrm>
+          <a:prstGeom prst="rect">
+            <a:avLst/>
+          </a:prstGeom>
+          <a:noFill/>
+        </p:spPr>
+        <p:txBody>
+          <a:bodyPr wrap="none" rtlCol="0">
+            <a:spAutoFit/>
+          </a:bodyPr>
+          <a:lstStyle/>
+          <a:p>
+            <a:pPr algn="l"/>
+            <a:r>
+              <a:rPr lang="en-US" sz="1000" dirty="0">
+                <a:cs typeface="Arial" panose="020B0604020202020204" pitchFamily="34" charset="0"/>
+              </a:rPr>
+              <a:t>BAP Avoidance Plan</a:t>
+            </a:r>
+          </a:p>
+        </p:txBody>
+      </p:sp>
+      <p:sp>
+        <p:nvSpPr>
+          <p:cNvPr id="35" name="TextBox 34">
+            <a:extLst>
+              <a:ext uri="{FF2B5EF4-FFF2-40B4-BE49-F238E27FC236}">
+                <a16:creationId xmlns:a16="http://schemas.microsoft.com/office/drawing/2014/main" id="{5D20F7BB-2724-49FA-BC7C-8FF5A6030942}"/>
+              </a:ext>
+            </a:extLst>
+          </p:cNvPr>
+          <p:cNvSpPr txBox="1"/>
+          <p:nvPr/>
+        </p:nvSpPr>
+        <p:spPr>
+          <a:xfrm>
+            <a:off x="8580373" y="3361242"/>
+            <a:ext cx="1098378" cy="400110"/>
+          </a:xfrm>
+          <a:prstGeom prst="rect">
+            <a:avLst/>
+          </a:prstGeom>
+          <a:noFill/>
+        </p:spPr>
+        <p:txBody>
+          <a:bodyPr wrap="none" rtlCol="0">
+            <a:spAutoFit/>
+          </a:bodyPr>
+          <a:lstStyle/>
+          <a:p>
+            <a:pPr algn="l"/>
+            <a:r>
+              <a:rPr lang="en-US" sz="1000" dirty="0">
+                <a:cs typeface="Arial" panose="020B0604020202020204" pitchFamily="34" charset="0"/>
+              </a:rPr>
+              <a:t>Aircraft State and</a:t>
+            </a:r>
+          </a:p>
+          <a:p>
+            <a:pPr algn="l"/>
+            <a:r>
+              <a:rPr lang="en-US" sz="1000" dirty="0">
+                <a:cs typeface="Arial" panose="020B0604020202020204" pitchFamily="34" charset="0"/>
+              </a:rPr>
+              <a:t>Initial Flight Plan</a:t>
+            </a:r>
+          </a:p>
+        </p:txBody>
+      </p:sp>
+      <p:sp>
+        <p:nvSpPr>
+          <p:cNvPr id="39" name="TextBox 38">
+            <a:extLst>
+              <a:ext uri="{FF2B5EF4-FFF2-40B4-BE49-F238E27FC236}">
+                <a16:creationId xmlns:a16="http://schemas.microsoft.com/office/drawing/2014/main" id="{36E46D6F-0C3E-42A6-80A7-BB92466B90D7}"/>
+              </a:ext>
+            </a:extLst>
+          </p:cNvPr>
+          <p:cNvSpPr txBox="1"/>
+          <p:nvPr/>
+        </p:nvSpPr>
+        <p:spPr>
+          <a:xfrm>
+            <a:off x="9530644" y="1537156"/>
+            <a:ext cx="1063112" cy="246221"/>
+          </a:xfrm>
+          <a:prstGeom prst="rect">
+            <a:avLst/>
+          </a:prstGeom>
+          <a:noFill/>
+        </p:spPr>
+        <p:txBody>
+          <a:bodyPr wrap="none" rtlCol="0">
+            <a:spAutoFit/>
+          </a:bodyPr>
+          <a:lstStyle/>
+          <a:p>
+            <a:pPr algn="l"/>
+            <a:r>
+              <a:rPr lang="en-US" sz="1000" dirty="0">
+                <a:cs typeface="Arial" panose="020B0604020202020204" pitchFamily="34" charset="0"/>
+              </a:rPr>
+              <a:t>Intruder Position</a:t>
+            </a:r>
+          </a:p>
+        </p:txBody>
+      </p:sp>
+      <p:cxnSp>
+        <p:nvCxnSpPr>
+          <p:cNvPr id="41" name="Straight Arrow Connector 40">
+            <a:extLst>
+              <a:ext uri="{FF2B5EF4-FFF2-40B4-BE49-F238E27FC236}">
+                <a16:creationId xmlns:a16="http://schemas.microsoft.com/office/drawing/2014/main" id="{A4C12FE7-3100-4B49-8EBA-69D9AE6FD3FD}"/>
+              </a:ext>
+            </a:extLst>
+          </p:cNvPr>
+          <p:cNvCxnSpPr>
+            <a:stCxn id="14" idx="3"/>
+            <a:endCxn id="16" idx="1"/>
+          </p:cNvCxnSpPr>
+          <p:nvPr/>
+        </p:nvCxnSpPr>
+        <p:spPr>
+          <a:xfrm>
+            <a:off x="1626126" y="5133305"/>
+            <a:ext cx="1003174" cy="152"/>
+          </a:xfrm>
+          <a:prstGeom prst="straightConnector1">
+            <a:avLst/>
+          </a:prstGeom>
+          <a:ln w="19050">
+            <a:solidFill>
+              <a:schemeClr val="tx1"/>
+            </a:solidFill>
+            <a:headEnd type="none" w="med" len="med"/>
+            <a:tailEnd type="arrow" w="med" len="med"/>
+          </a:ln>
+          <a:effectLst/>
+        </p:spPr>
+        <p:style>
+          <a:lnRef idx="2">
+            <a:schemeClr val="accent1"/>
+          </a:lnRef>
+          <a:fillRef idx="0">
+            <a:schemeClr val="accent1"/>
+          </a:fillRef>
+          <a:effectRef idx="1">
+            <a:schemeClr val="accent1"/>
+          </a:effectRef>
+          <a:fontRef idx="minor">
+            <a:schemeClr val="tx1"/>
+          </a:fontRef>
+        </p:style>
+      </p:cxnSp>
+      <p:sp>
+        <p:nvSpPr>
+          <p:cNvPr id="42" name="Rectangle 41">
+            <a:extLst>
+              <a:ext uri="{FF2B5EF4-FFF2-40B4-BE49-F238E27FC236}">
+                <a16:creationId xmlns:a16="http://schemas.microsoft.com/office/drawing/2014/main" id="{B1358106-3365-47DD-9865-D35BC054E462}"/>
+              </a:ext>
+            </a:extLst>
+          </p:cNvPr>
+          <p:cNvSpPr/>
+          <p:nvPr/>
+        </p:nvSpPr>
+        <p:spPr>
+          <a:xfrm>
+            <a:off x="528360" y="4735283"/>
+            <a:ext cx="3219522" cy="838878"/>
+          </a:xfrm>
+          <a:prstGeom prst="rect">
+            <a:avLst/>
+          </a:prstGeom>
+          <a:noFill/>
+          <a:ln w="19050">
+            <a:solidFill>
+              <a:schemeClr val="tx1"/>
+            </a:solidFill>
+            <a:prstDash val="dash"/>
+          </a:ln>
+          <a:effectLst/>
+        </p:spPr>
+        <p:style>
+          <a:lnRef idx="1">
+            <a:schemeClr val="accent1"/>
+          </a:lnRef>
+          <a:fillRef idx="3">
+            <a:schemeClr val="accent1"/>
+          </a:fillRef>
+          <a:effectRef idx="2">
+            <a:schemeClr val="accent1"/>
+          </a:effectRef>
+          <a:fontRef idx="minor">
+            <a:schemeClr val="lt1"/>
+          </a:fontRef>
+        </p:style>
+        <p:txBody>
+          <a:bodyPr rtlCol="0" anchor="b"/>
+          <a:lstStyle/>
+          <a:p>
+            <a:pPr algn="ctr"/>
+            <a:r>
+              <a:rPr lang="en-US" sz="1100" dirty="0">
+                <a:solidFill>
+                  <a:schemeClr val="tx1"/>
+                </a:solidFill>
+                <a:cs typeface="Arial" panose="020B0604020202020204" pitchFamily="34" charset="0"/>
+              </a:rPr>
+              <a:t>DAA</a:t>
+            </a:r>
+            <a:endParaRPr lang="en-US" sz="1050" dirty="0">
+              <a:solidFill>
+                <a:schemeClr val="tx1"/>
+              </a:solidFill>
+              <a:cs typeface="Arial" panose="020B0604020202020204" pitchFamily="34" charset="0"/>
+            </a:endParaRPr>
+          </a:p>
+        </p:txBody>
+      </p:sp>
+      <p:sp>
+        <p:nvSpPr>
+          <p:cNvPr id="43" name="Rectangle 42">
+            <a:extLst>
+              <a:ext uri="{FF2B5EF4-FFF2-40B4-BE49-F238E27FC236}">
+                <a16:creationId xmlns:a16="http://schemas.microsoft.com/office/drawing/2014/main" id="{9B8CEA8A-360D-425E-8CD7-821D3815AC20}"/>
+              </a:ext>
+            </a:extLst>
+          </p:cNvPr>
+          <p:cNvSpPr/>
+          <p:nvPr/>
+        </p:nvSpPr>
+        <p:spPr>
+          <a:xfrm>
+            <a:off x="10542291" y="2206929"/>
+            <a:ext cx="1062396" cy="1000385"/>
+          </a:xfrm>
+          <a:prstGeom prst="rect">
+            <a:avLst/>
+          </a:prstGeom>
+          <a:solidFill>
+            <a:schemeClr val="bg1">
+              <a:lumMod val="85000"/>
+            </a:schemeClr>
+          </a:solidFill>
+          <a:ln w="19050">
+            <a:solidFill>
+              <a:schemeClr val="tx1"/>
+            </a:solidFill>
+          </a:ln>
+          <a:effectLst/>
+        </p:spPr>
+        <p:style>
+          <a:lnRef idx="1">
+            <a:schemeClr val="accent1"/>
+          </a:lnRef>
+          <a:fillRef idx="3">
+            <a:schemeClr val="accent1"/>
+          </a:fillRef>
+          <a:effectRef idx="2">
+            <a:schemeClr val="accent1"/>
+          </a:effectRef>
+          <a:fontRef idx="minor">
+            <a:schemeClr val="lt1"/>
+          </a:fontRef>
+        </p:style>
+        <p:txBody>
+          <a:bodyPr rtlCol="0" anchor="ctr"/>
+          <a:lstStyle/>
+          <a:p>
+            <a:pPr algn="ctr"/>
+            <a:r>
+              <a:rPr lang="en-US" sz="1100" dirty="0">
+                <a:solidFill>
+                  <a:schemeClr val="tx1"/>
+                </a:solidFill>
+              </a:rPr>
+              <a:t>Target Aircraft (Intruder)</a:t>
+            </a:r>
+          </a:p>
+        </p:txBody>
+      </p:sp>
+      <p:sp>
+        <p:nvSpPr>
+          <p:cNvPr id="45" name="Rectangle 44">
+            <a:extLst>
+              <a:ext uri="{FF2B5EF4-FFF2-40B4-BE49-F238E27FC236}">
+                <a16:creationId xmlns:a16="http://schemas.microsoft.com/office/drawing/2014/main" id="{3CCB37B7-7715-4049-8F49-5057D1D03032}"/>
+              </a:ext>
+            </a:extLst>
+          </p:cNvPr>
+          <p:cNvSpPr/>
+          <p:nvPr/>
+        </p:nvSpPr>
+        <p:spPr>
+          <a:xfrm>
+            <a:off x="8724263" y="4059196"/>
+            <a:ext cx="1004244" cy="1361287"/>
+          </a:xfrm>
+          <a:prstGeom prst="rect">
+            <a:avLst/>
+          </a:prstGeom>
+          <a:noFill/>
+          <a:ln w="19050">
+            <a:solidFill>
+              <a:schemeClr val="tx1"/>
+            </a:solidFill>
+          </a:ln>
+          <a:effectLst/>
+        </p:spPr>
+        <p:style>
+          <a:lnRef idx="1">
+            <a:schemeClr val="accent1"/>
+          </a:lnRef>
+          <a:fillRef idx="3">
+            <a:schemeClr val="accent1"/>
+          </a:fillRef>
+          <a:effectRef idx="2">
+            <a:schemeClr val="accent1"/>
+          </a:effectRef>
+          <a:fontRef idx="minor">
+            <a:schemeClr val="lt1"/>
+          </a:fontRef>
+        </p:style>
+        <p:txBody>
+          <a:bodyPr rtlCol="0" anchor="ctr"/>
+          <a:lstStyle/>
+          <a:p>
+            <a:pPr algn="ctr"/>
+            <a:r>
+              <a:rPr lang="en-US" sz="1050" dirty="0">
+                <a:solidFill>
+                  <a:schemeClr val="tx1"/>
+                </a:solidFill>
+              </a:rPr>
+              <a:t>Autonomous Executive</a:t>
+            </a:r>
+          </a:p>
+        </p:txBody>
+      </p:sp>
+      <p:cxnSp>
+        <p:nvCxnSpPr>
+          <p:cNvPr id="46" name="Straight Arrow Connector 45">
+            <a:extLst>
+              <a:ext uri="{FF2B5EF4-FFF2-40B4-BE49-F238E27FC236}">
+                <a16:creationId xmlns:a16="http://schemas.microsoft.com/office/drawing/2014/main" id="{4FAC9D41-4B75-4329-BC4B-71E59BABB022}"/>
+              </a:ext>
+            </a:extLst>
+          </p:cNvPr>
+          <p:cNvCxnSpPr>
+            <a:cxnSpLocks/>
+            <a:stCxn id="45" idx="3"/>
+            <a:endCxn id="17" idx="1"/>
+          </p:cNvCxnSpPr>
+          <p:nvPr/>
+        </p:nvCxnSpPr>
+        <p:spPr>
+          <a:xfrm>
+            <a:off x="9728507" y="4739840"/>
+            <a:ext cx="781706" cy="2342"/>
+          </a:xfrm>
+          <a:prstGeom prst="straightConnector1">
+            <a:avLst/>
+          </a:prstGeom>
+          <a:ln w="19050">
+            <a:solidFill>
+              <a:schemeClr val="tx1"/>
+            </a:solidFill>
+            <a:headEnd type="none" w="med" len="med"/>
+            <a:tailEnd type="arrow" w="med" len="med"/>
+          </a:ln>
+          <a:effectLst/>
+        </p:spPr>
+        <p:style>
+          <a:lnRef idx="2">
+            <a:schemeClr val="accent1"/>
+          </a:lnRef>
+          <a:fillRef idx="0">
+            <a:schemeClr val="accent1"/>
+          </a:fillRef>
+          <a:effectRef idx="1">
+            <a:schemeClr val="accent1"/>
+          </a:effectRef>
+          <a:fontRef idx="minor">
+            <a:schemeClr val="tx1"/>
+          </a:fontRef>
+        </p:style>
+      </p:cxnSp>
+      <p:sp>
+        <p:nvSpPr>
+          <p:cNvPr id="47" name="Rectangle 46">
+            <a:extLst>
+              <a:ext uri="{FF2B5EF4-FFF2-40B4-BE49-F238E27FC236}">
+                <a16:creationId xmlns:a16="http://schemas.microsoft.com/office/drawing/2014/main" id="{55B444AB-657A-44DF-B1E3-F28AA6A07C4D}"/>
+              </a:ext>
+            </a:extLst>
+          </p:cNvPr>
+          <p:cNvSpPr/>
+          <p:nvPr/>
+        </p:nvSpPr>
+        <p:spPr>
+          <a:xfrm>
+            <a:off x="6869132" y="4059196"/>
+            <a:ext cx="1004244" cy="1361287"/>
+          </a:xfrm>
+          <a:prstGeom prst="rect">
+            <a:avLst/>
+          </a:prstGeom>
+          <a:noFill/>
+          <a:ln w="19050">
+            <a:solidFill>
+              <a:schemeClr val="tx1"/>
+            </a:solidFill>
+          </a:ln>
+          <a:effectLst/>
+        </p:spPr>
+        <p:style>
+          <a:lnRef idx="1">
+            <a:schemeClr val="accent1"/>
+          </a:lnRef>
+          <a:fillRef idx="3">
+            <a:schemeClr val="accent1"/>
+          </a:fillRef>
+          <a:effectRef idx="2">
+            <a:schemeClr val="accent1"/>
+          </a:effectRef>
+          <a:fontRef idx="minor">
+            <a:schemeClr val="lt1"/>
+          </a:fontRef>
+        </p:style>
+        <p:txBody>
+          <a:bodyPr rtlCol="0" anchor="ctr"/>
+          <a:lstStyle/>
+          <a:p>
+            <a:pPr algn="ctr"/>
+            <a:r>
+              <a:rPr lang="en-US" sz="1050" dirty="0">
+                <a:solidFill>
+                  <a:schemeClr val="tx1"/>
+                </a:solidFill>
+              </a:rPr>
+              <a:t>Plan Switch</a:t>
+            </a:r>
+          </a:p>
+        </p:txBody>
+      </p:sp>
+      <p:cxnSp>
+        <p:nvCxnSpPr>
+          <p:cNvPr id="48" name="Straight Arrow Connector 47">
+            <a:extLst>
+              <a:ext uri="{FF2B5EF4-FFF2-40B4-BE49-F238E27FC236}">
+                <a16:creationId xmlns:a16="http://schemas.microsoft.com/office/drawing/2014/main" id="{BB8C9EE6-010B-47B5-907A-7D99DC128D65}"/>
+              </a:ext>
+            </a:extLst>
+          </p:cNvPr>
+          <p:cNvCxnSpPr>
+            <a:cxnSpLocks/>
+            <a:stCxn id="47" idx="3"/>
+            <a:endCxn id="45" idx="1"/>
+          </p:cNvCxnSpPr>
+          <p:nvPr/>
+        </p:nvCxnSpPr>
+        <p:spPr>
+          <a:xfrm>
+            <a:off x="7873376" y="4739840"/>
+            <a:ext cx="850887" cy="0"/>
+          </a:xfrm>
+          <a:prstGeom prst="straightConnector1">
+            <a:avLst/>
+          </a:prstGeom>
+          <a:ln w="19050">
+            <a:solidFill>
+              <a:schemeClr val="tx1"/>
+            </a:solidFill>
+            <a:headEnd type="none" w="med" len="med"/>
+            <a:tailEnd type="arrow" w="med" len="med"/>
+          </a:ln>
+          <a:effectLst/>
+        </p:spPr>
+        <p:style>
+          <a:lnRef idx="2">
+            <a:schemeClr val="accent1"/>
+          </a:lnRef>
+          <a:fillRef idx="0">
+            <a:schemeClr val="accent1"/>
+          </a:fillRef>
+          <a:effectRef idx="1">
+            <a:schemeClr val="accent1"/>
+          </a:effectRef>
+          <a:fontRef idx="minor">
+            <a:schemeClr val="tx1"/>
+          </a:fontRef>
+        </p:style>
+      </p:cxnSp>
+      <p:cxnSp>
+        <p:nvCxnSpPr>
+          <p:cNvPr id="61" name="Elbow Connector 30">
+            <a:extLst>
+              <a:ext uri="{FF2B5EF4-FFF2-40B4-BE49-F238E27FC236}">
+                <a16:creationId xmlns:a16="http://schemas.microsoft.com/office/drawing/2014/main" id="{6E0BF803-2DE9-4D1B-BCAD-E5B242F494E7}"/>
+              </a:ext>
+            </a:extLst>
+          </p:cNvPr>
+          <p:cNvCxnSpPr>
+            <a:cxnSpLocks/>
+            <a:stCxn id="17" idx="0"/>
+            <a:endCxn id="15" idx="0"/>
+          </p:cNvCxnSpPr>
+          <p:nvPr/>
+        </p:nvCxnSpPr>
+        <p:spPr>
+          <a:xfrm rot="16200000" flipV="1">
+            <a:off x="7070930" y="22405"/>
+            <a:ext cx="92073" cy="7986194"/>
+          </a:xfrm>
+          <a:prstGeom prst="bentConnector3">
+            <a:avLst>
+              <a:gd name="adj1" fmla="val 348281"/>
+            </a:avLst>
+          </a:prstGeom>
+          <a:ln w="19050">
+            <a:solidFill>
+              <a:schemeClr val="tx1"/>
+            </a:solidFill>
+            <a:headEnd type="none" w="med" len="med"/>
+            <a:tailEnd type="arrow" w="med" len="med"/>
+          </a:ln>
+          <a:effectLst/>
+        </p:spPr>
+        <p:style>
+          <a:lnRef idx="2">
+            <a:schemeClr val="accent1"/>
+          </a:lnRef>
+          <a:fillRef idx="0">
+            <a:schemeClr val="accent1"/>
+          </a:fillRef>
+          <a:effectRef idx="1">
+            <a:schemeClr val="accent1"/>
+          </a:effectRef>
+          <a:fontRef idx="minor">
+            <a:schemeClr val="tx1"/>
+          </a:fontRef>
+        </p:style>
+      </p:cxnSp>
+      <p:cxnSp>
+        <p:nvCxnSpPr>
+          <p:cNvPr id="63" name="Elbow Connector 30">
+            <a:extLst>
+              <a:ext uri="{FF2B5EF4-FFF2-40B4-BE49-F238E27FC236}">
+                <a16:creationId xmlns:a16="http://schemas.microsoft.com/office/drawing/2014/main" id="{1233E01F-C6EC-49B9-9785-8C6E58597890}"/>
+              </a:ext>
+            </a:extLst>
+          </p:cNvPr>
+          <p:cNvCxnSpPr>
+            <a:cxnSpLocks/>
+            <a:stCxn id="43" idx="0"/>
+            <a:endCxn id="9" idx="3"/>
+          </p:cNvCxnSpPr>
+          <p:nvPr/>
+        </p:nvCxnSpPr>
+        <p:spPr>
+          <a:xfrm rot="16200000" flipV="1">
+            <a:off x="6118299" y="-2748262"/>
+            <a:ext cx="463018" cy="9447363"/>
+          </a:xfrm>
+          <a:prstGeom prst="bentConnector2">
+            <a:avLst/>
+          </a:prstGeom>
+          <a:ln w="19050">
+            <a:solidFill>
+              <a:schemeClr val="tx1"/>
+            </a:solidFill>
+            <a:headEnd type="none" w="med" len="med"/>
+            <a:tailEnd type="arrow" w="med" len="med"/>
+          </a:ln>
+          <a:effectLst/>
+        </p:spPr>
+        <p:style>
+          <a:lnRef idx="2">
+            <a:schemeClr val="accent1"/>
+          </a:lnRef>
+          <a:fillRef idx="0">
+            <a:schemeClr val="accent1"/>
+          </a:fillRef>
+          <a:effectRef idx="1">
+            <a:schemeClr val="accent1"/>
+          </a:effectRef>
+          <a:fontRef idx="minor">
+            <a:schemeClr val="tx1"/>
+          </a:fontRef>
+        </p:style>
+      </p:cxnSp>
+      <p:cxnSp>
+        <p:nvCxnSpPr>
+          <p:cNvPr id="68" name="Elbow Connector 30">
+            <a:extLst>
+              <a:ext uri="{FF2B5EF4-FFF2-40B4-BE49-F238E27FC236}">
+                <a16:creationId xmlns:a16="http://schemas.microsoft.com/office/drawing/2014/main" id="{54AA6FCF-8448-4316-9509-BA362751DB2C}"/>
+              </a:ext>
+            </a:extLst>
+          </p:cNvPr>
+          <p:cNvCxnSpPr>
+            <a:cxnSpLocks/>
+            <a:stCxn id="14" idx="0"/>
+            <a:endCxn id="15" idx="1"/>
+          </p:cNvCxnSpPr>
+          <p:nvPr/>
+        </p:nvCxnSpPr>
+        <p:spPr>
+          <a:xfrm rot="5400000" flipH="1" flipV="1">
+            <a:off x="1611899" y="3802514"/>
+            <a:ext cx="537060" cy="1497742"/>
+          </a:xfrm>
+          <a:prstGeom prst="bentConnector2">
+            <a:avLst/>
+          </a:prstGeom>
+          <a:ln w="19050">
+            <a:solidFill>
+              <a:schemeClr val="tx1"/>
+            </a:solidFill>
+            <a:headEnd type="none" w="med" len="med"/>
+            <a:tailEnd type="arrow" w="med" len="med"/>
+          </a:ln>
+          <a:effectLst/>
+        </p:spPr>
+        <p:style>
+          <a:lnRef idx="2">
+            <a:schemeClr val="accent1"/>
+          </a:lnRef>
+          <a:fillRef idx="0">
+            <a:schemeClr val="accent1"/>
+          </a:fillRef>
+          <a:effectRef idx="1">
+            <a:schemeClr val="accent1"/>
+          </a:effectRef>
+          <a:fontRef idx="minor">
+            <a:schemeClr val="tx1"/>
+          </a:fontRef>
+        </p:style>
+      </p:cxnSp>
+      <p:sp>
+        <p:nvSpPr>
+          <p:cNvPr id="72" name="TextBox 71">
+            <a:extLst>
+              <a:ext uri="{FF2B5EF4-FFF2-40B4-BE49-F238E27FC236}">
+                <a16:creationId xmlns:a16="http://schemas.microsoft.com/office/drawing/2014/main" id="{F965DFC0-3450-480A-9B46-D3FD725667BA}"/>
+              </a:ext>
+            </a:extLst>
+          </p:cNvPr>
+          <p:cNvSpPr txBox="1"/>
+          <p:nvPr/>
+        </p:nvSpPr>
+        <p:spPr>
+          <a:xfrm rot="16200000">
+            <a:off x="498211" y="3381234"/>
+            <a:ext cx="1035861" cy="246221"/>
+          </a:xfrm>
+          <a:prstGeom prst="rect">
+            <a:avLst/>
+          </a:prstGeom>
+          <a:noFill/>
+        </p:spPr>
+        <p:txBody>
+          <a:bodyPr wrap="none" rtlCol="0">
+            <a:spAutoFit/>
+          </a:bodyPr>
+          <a:lstStyle/>
+          <a:p>
+            <a:pPr algn="l"/>
+            <a:r>
+              <a:rPr lang="en-US" sz="1000" dirty="0">
+                <a:cs typeface="Arial" panose="020B0604020202020204" pitchFamily="34" charset="0"/>
+              </a:rPr>
+              <a:t>ADS-B messages</a:t>
+            </a:r>
+            <a:endParaRPr lang="en-US" sz="900" dirty="0">
+              <a:cs typeface="Arial" panose="020B0604020202020204" pitchFamily="34" charset="0"/>
+            </a:endParaRPr>
+          </a:p>
+        </p:txBody>
+      </p:sp>
+      <p:sp>
+        <p:nvSpPr>
+          <p:cNvPr id="80" name="TextBox 79">
+            <a:extLst>
+              <a:ext uri="{FF2B5EF4-FFF2-40B4-BE49-F238E27FC236}">
+                <a16:creationId xmlns:a16="http://schemas.microsoft.com/office/drawing/2014/main" id="{6856FC40-8CF7-4320-A58D-84C590A28F33}"/>
+              </a:ext>
+            </a:extLst>
+          </p:cNvPr>
+          <p:cNvSpPr txBox="1"/>
+          <p:nvPr/>
+        </p:nvSpPr>
+        <p:spPr>
+          <a:xfrm>
+            <a:off x="8060051" y="4364063"/>
+            <a:ext cx="700833" cy="369332"/>
+          </a:xfrm>
+          <a:prstGeom prst="rect">
+            <a:avLst/>
+          </a:prstGeom>
+          <a:noFill/>
+        </p:spPr>
+        <p:txBody>
+          <a:bodyPr wrap="none" rtlCol="0">
+            <a:spAutoFit/>
+          </a:bodyPr>
+          <a:lstStyle/>
+          <a:p>
+            <a:pPr algn="l"/>
+            <a:r>
+              <a:rPr lang="en-US" sz="900" dirty="0">
+                <a:cs typeface="Arial" panose="020B0604020202020204" pitchFamily="34" charset="0"/>
+              </a:rPr>
+              <a:t>Avoidance </a:t>
+            </a:r>
+          </a:p>
+          <a:p>
+            <a:pPr algn="l"/>
+            <a:r>
+              <a:rPr lang="en-US" sz="900" dirty="0">
+                <a:cs typeface="Arial" panose="020B0604020202020204" pitchFamily="34" charset="0"/>
+              </a:rPr>
+              <a:t>Plan</a:t>
+            </a:r>
+          </a:p>
+        </p:txBody>
+      </p:sp>
+      <p:sp>
+        <p:nvSpPr>
+          <p:cNvPr id="82" name="TextBox 81">
+            <a:extLst>
+              <a:ext uri="{FF2B5EF4-FFF2-40B4-BE49-F238E27FC236}">
+                <a16:creationId xmlns:a16="http://schemas.microsoft.com/office/drawing/2014/main" id="{2EFF5CB8-12AF-4EC9-AE77-34C86CB136F9}"/>
+              </a:ext>
+            </a:extLst>
+          </p:cNvPr>
+          <p:cNvSpPr txBox="1"/>
+          <p:nvPr/>
+        </p:nvSpPr>
+        <p:spPr>
+          <a:xfrm>
+            <a:off x="9718392" y="4472978"/>
+            <a:ext cx="771365" cy="246221"/>
+          </a:xfrm>
+          <a:prstGeom prst="rect">
+            <a:avLst/>
+          </a:prstGeom>
+          <a:noFill/>
+        </p:spPr>
+        <p:txBody>
+          <a:bodyPr wrap="none" rtlCol="0">
+            <a:spAutoFit/>
+          </a:bodyPr>
+          <a:lstStyle/>
+          <a:p>
+            <a:pPr algn="l"/>
+            <a:r>
+              <a:rPr lang="en-US" sz="1000" dirty="0">
+                <a:cs typeface="Arial" panose="020B0604020202020204" pitchFamily="34" charset="0"/>
+              </a:rPr>
+              <a:t>Commands</a:t>
+            </a:r>
+          </a:p>
+        </p:txBody>
+      </p:sp>
+      <p:sp>
+        <p:nvSpPr>
+          <p:cNvPr id="10" name="Rectangle 9">
+            <a:extLst>
+              <a:ext uri="{FF2B5EF4-FFF2-40B4-BE49-F238E27FC236}">
+                <a16:creationId xmlns:a16="http://schemas.microsoft.com/office/drawing/2014/main" id="{B2EE4163-6915-458E-A7E6-62B2CB0DE81D}"/>
+              </a:ext>
+            </a:extLst>
+          </p:cNvPr>
+          <p:cNvSpPr/>
+          <p:nvPr/>
+        </p:nvSpPr>
+        <p:spPr>
+          <a:xfrm>
+            <a:off x="4017516" y="2068112"/>
+            <a:ext cx="989137" cy="626780"/>
+          </a:xfrm>
+          <a:prstGeom prst="rect">
+            <a:avLst/>
+          </a:prstGeom>
+          <a:noFill/>
+          <a:ln w="19050">
+            <a:solidFill>
+              <a:schemeClr val="tx1"/>
+            </a:solidFill>
+          </a:ln>
+          <a:effectLst/>
+        </p:spPr>
+        <p:style>
+          <a:lnRef idx="1">
+            <a:schemeClr val="accent1"/>
+          </a:lnRef>
+          <a:fillRef idx="3">
+            <a:schemeClr val="accent1"/>
+          </a:fillRef>
+          <a:effectRef idx="2">
+            <a:schemeClr val="accent1"/>
+          </a:effectRef>
+          <a:fontRef idx="minor">
+            <a:schemeClr val="lt1"/>
+          </a:fontRef>
+        </p:style>
+        <p:txBody>
+          <a:bodyPr rtlCol="0" anchor="ctr"/>
+          <a:lstStyle/>
+          <a:p>
+            <a:pPr algn="ctr"/>
+            <a:r>
+              <a:rPr lang="en-US" sz="1050" dirty="0">
+                <a:solidFill>
+                  <a:schemeClr val="tx1"/>
+                </a:solidFill>
+              </a:rPr>
+              <a:t>Intruder Trajectory</a:t>
+            </a:r>
+          </a:p>
+          <a:p>
+            <a:pPr algn="ctr"/>
+            <a:r>
+              <a:rPr lang="en-US" sz="1050" dirty="0">
+                <a:solidFill>
+                  <a:schemeClr val="tx1"/>
+                </a:solidFill>
+              </a:rPr>
+              <a:t>Prediction</a:t>
+            </a:r>
+          </a:p>
+        </p:txBody>
+      </p:sp>
+      <p:sp>
+        <p:nvSpPr>
+          <p:cNvPr id="11" name="Rectangle 10">
+            <a:extLst>
+              <a:ext uri="{FF2B5EF4-FFF2-40B4-BE49-F238E27FC236}">
+                <a16:creationId xmlns:a16="http://schemas.microsoft.com/office/drawing/2014/main" id="{EA8F5FF6-7C98-4371-880D-DD27F1D0007F}"/>
+              </a:ext>
+            </a:extLst>
+          </p:cNvPr>
+          <p:cNvSpPr/>
+          <p:nvPr/>
+        </p:nvSpPr>
+        <p:spPr>
+          <a:xfrm>
+            <a:off x="5496322" y="2401086"/>
+            <a:ext cx="989137" cy="626780"/>
+          </a:xfrm>
+          <a:prstGeom prst="rect">
+            <a:avLst/>
+          </a:prstGeom>
+          <a:noFill/>
+          <a:ln w="19050">
+            <a:solidFill>
+              <a:schemeClr val="tx1"/>
+            </a:solidFill>
+          </a:ln>
+          <a:effectLst/>
+        </p:spPr>
+        <p:style>
+          <a:lnRef idx="1">
+            <a:schemeClr val="accent1"/>
+          </a:lnRef>
+          <a:fillRef idx="3">
+            <a:schemeClr val="accent1"/>
+          </a:fillRef>
+          <a:effectRef idx="2">
+            <a:schemeClr val="accent1"/>
+          </a:effectRef>
+          <a:fontRef idx="minor">
+            <a:schemeClr val="lt1"/>
+          </a:fontRef>
+        </p:style>
+        <p:txBody>
+          <a:bodyPr rtlCol="0" anchor="ctr"/>
+          <a:lstStyle/>
+          <a:p>
+            <a:pPr algn="ctr"/>
+            <a:r>
+              <a:rPr lang="en-US" sz="1050" dirty="0">
+                <a:solidFill>
+                  <a:schemeClr val="tx1"/>
+                </a:solidFill>
+              </a:rPr>
+              <a:t>Remain Well Clear Assessment</a:t>
+            </a:r>
+          </a:p>
+        </p:txBody>
+      </p:sp>
+      <p:cxnSp>
+        <p:nvCxnSpPr>
+          <p:cNvPr id="12" name="Elbow Connector 14">
+            <a:extLst>
+              <a:ext uri="{FF2B5EF4-FFF2-40B4-BE49-F238E27FC236}">
+                <a16:creationId xmlns:a16="http://schemas.microsoft.com/office/drawing/2014/main" id="{B3482453-6FDB-456C-A95A-422FF231835F}"/>
+              </a:ext>
+            </a:extLst>
+          </p:cNvPr>
+          <p:cNvCxnSpPr>
+            <a:cxnSpLocks/>
+            <a:stCxn id="10" idx="3"/>
+          </p:cNvCxnSpPr>
+          <p:nvPr/>
+        </p:nvCxnSpPr>
+        <p:spPr>
+          <a:xfrm>
+            <a:off x="5006654" y="2381502"/>
+            <a:ext cx="482310" cy="153913"/>
+          </a:xfrm>
+          <a:prstGeom prst="bentConnector3">
+            <a:avLst/>
+          </a:prstGeom>
+          <a:ln w="19050">
+            <a:solidFill>
+              <a:schemeClr val="tx1"/>
+            </a:solidFill>
+            <a:headEnd type="none" w="med" len="med"/>
+            <a:tailEnd type="arrow" w="med" len="med"/>
+          </a:ln>
+          <a:effectLst/>
+        </p:spPr>
+        <p:style>
+          <a:lnRef idx="2">
+            <a:schemeClr val="accent1"/>
+          </a:lnRef>
+          <a:fillRef idx="0">
+            <a:schemeClr val="accent1"/>
+          </a:fillRef>
+          <a:effectRef idx="1">
+            <a:schemeClr val="accent1"/>
+          </a:effectRef>
+          <a:fontRef idx="minor">
+            <a:schemeClr val="tx1"/>
+          </a:fontRef>
+        </p:style>
+      </p:cxnSp>
+      <p:cxnSp>
+        <p:nvCxnSpPr>
+          <p:cNvPr id="19" name="Elbow Connector 24">
+            <a:extLst>
+              <a:ext uri="{FF2B5EF4-FFF2-40B4-BE49-F238E27FC236}">
+                <a16:creationId xmlns:a16="http://schemas.microsoft.com/office/drawing/2014/main" id="{4A6E9041-0A80-4C06-98FC-464C40248606}"/>
+              </a:ext>
+            </a:extLst>
+          </p:cNvPr>
+          <p:cNvCxnSpPr>
+            <a:stCxn id="15" idx="3"/>
+            <a:endCxn id="52" idx="2"/>
+          </p:cNvCxnSpPr>
+          <p:nvPr/>
+        </p:nvCxnSpPr>
+        <p:spPr>
+          <a:xfrm flipV="1">
+            <a:off x="3618437" y="3418495"/>
+            <a:ext cx="714916" cy="864360"/>
+          </a:xfrm>
+          <a:prstGeom prst="bentConnector2">
+            <a:avLst/>
+          </a:prstGeom>
+          <a:ln w="19050">
+            <a:solidFill>
+              <a:schemeClr val="tx1"/>
+            </a:solidFill>
+            <a:headEnd type="none" w="med" len="med"/>
+            <a:tailEnd type="arrow" w="med" len="med"/>
+          </a:ln>
+          <a:effectLst/>
+        </p:spPr>
+        <p:style>
+          <a:lnRef idx="2">
+            <a:schemeClr val="accent1"/>
+          </a:lnRef>
+          <a:fillRef idx="0">
+            <a:schemeClr val="accent1"/>
+          </a:fillRef>
+          <a:effectRef idx="1">
+            <a:schemeClr val="accent1"/>
+          </a:effectRef>
+          <a:fontRef idx="minor">
+            <a:schemeClr val="tx1"/>
+          </a:fontRef>
+        </p:style>
+      </p:cxnSp>
+      <p:cxnSp>
+        <p:nvCxnSpPr>
+          <p:cNvPr id="20" name="Elbow Connector 27">
+            <a:extLst>
+              <a:ext uri="{FF2B5EF4-FFF2-40B4-BE49-F238E27FC236}">
+                <a16:creationId xmlns:a16="http://schemas.microsoft.com/office/drawing/2014/main" id="{647EC8FB-F4FC-4FD6-93CA-A207AA7EED8E}"/>
+              </a:ext>
+            </a:extLst>
+          </p:cNvPr>
+          <p:cNvCxnSpPr>
+            <a:stCxn id="16" idx="3"/>
+            <a:endCxn id="50" idx="2"/>
+          </p:cNvCxnSpPr>
+          <p:nvPr/>
+        </p:nvCxnSpPr>
+        <p:spPr>
+          <a:xfrm flipV="1">
+            <a:off x="3618437" y="3429399"/>
+            <a:ext cx="893648" cy="1704058"/>
+          </a:xfrm>
+          <a:prstGeom prst="bentConnector2">
+            <a:avLst/>
+          </a:prstGeom>
+          <a:ln w="19050">
+            <a:solidFill>
+              <a:schemeClr val="tx1"/>
+            </a:solidFill>
+            <a:headEnd type="none" w="med" len="med"/>
+            <a:tailEnd type="arrow" w="med" len="med"/>
+          </a:ln>
+          <a:effectLst/>
+        </p:spPr>
+        <p:style>
+          <a:lnRef idx="2">
+            <a:schemeClr val="accent1"/>
+          </a:lnRef>
+          <a:fillRef idx="0">
+            <a:schemeClr val="accent1"/>
+          </a:fillRef>
+          <a:effectRef idx="1">
+            <a:schemeClr val="accent1"/>
+          </a:effectRef>
+          <a:fontRef idx="minor">
+            <a:schemeClr val="tx1"/>
+          </a:fontRef>
+        </p:style>
+      </p:cxnSp>
+      <p:cxnSp>
+        <p:nvCxnSpPr>
+          <p:cNvPr id="21" name="Elbow Connector 30">
+            <a:extLst>
+              <a:ext uri="{FF2B5EF4-FFF2-40B4-BE49-F238E27FC236}">
+                <a16:creationId xmlns:a16="http://schemas.microsoft.com/office/drawing/2014/main" id="{B3B50CFB-B261-4D90-8372-E05DB4E14BAF}"/>
+              </a:ext>
+            </a:extLst>
+          </p:cNvPr>
+          <p:cNvCxnSpPr>
+            <a:cxnSpLocks/>
+            <a:stCxn id="17" idx="0"/>
+            <a:endCxn id="51" idx="2"/>
+          </p:cNvCxnSpPr>
+          <p:nvPr/>
+        </p:nvCxnSpPr>
+        <p:spPr>
+          <a:xfrm rot="16200000" flipV="1">
+            <a:off x="7585991" y="537464"/>
+            <a:ext cx="628900" cy="6419249"/>
+          </a:xfrm>
+          <a:prstGeom prst="bentConnector3">
+            <a:avLst>
+              <a:gd name="adj1" fmla="val 50000"/>
+            </a:avLst>
+          </a:prstGeom>
+          <a:ln w="19050">
+            <a:solidFill>
+              <a:schemeClr val="tx1"/>
+            </a:solidFill>
+            <a:headEnd type="none" w="med" len="med"/>
+            <a:tailEnd type="arrow" w="med" len="med"/>
+          </a:ln>
+          <a:effectLst/>
+        </p:spPr>
+        <p:style>
+          <a:lnRef idx="2">
+            <a:schemeClr val="accent1"/>
+          </a:lnRef>
+          <a:fillRef idx="0">
+            <a:schemeClr val="accent1"/>
+          </a:fillRef>
+          <a:effectRef idx="1">
+            <a:schemeClr val="accent1"/>
+          </a:effectRef>
+          <a:fontRef idx="minor">
+            <a:schemeClr val="tx1"/>
+          </a:fontRef>
+        </p:style>
+      </p:cxnSp>
+      <p:cxnSp>
+        <p:nvCxnSpPr>
+          <p:cNvPr id="29" name="Elbow Connector 67">
+            <a:extLst>
+              <a:ext uri="{FF2B5EF4-FFF2-40B4-BE49-F238E27FC236}">
+                <a16:creationId xmlns:a16="http://schemas.microsoft.com/office/drawing/2014/main" id="{1D0D7BBB-700E-4682-A81B-05604C18458D}"/>
+              </a:ext>
+            </a:extLst>
+          </p:cNvPr>
+          <p:cNvCxnSpPr>
+            <a:cxnSpLocks/>
+            <a:stCxn id="9" idx="2"/>
+            <a:endCxn id="10" idx="1"/>
+          </p:cNvCxnSpPr>
+          <p:nvPr/>
+        </p:nvCxnSpPr>
+        <p:spPr>
+          <a:xfrm rot="16200000" flipH="1">
+            <a:off x="2412437" y="776422"/>
+            <a:ext cx="324201" cy="2885958"/>
+          </a:xfrm>
+          <a:prstGeom prst="bentConnector2">
+            <a:avLst/>
+          </a:prstGeom>
+          <a:ln w="19050">
+            <a:solidFill>
+              <a:schemeClr val="tx1"/>
+            </a:solidFill>
+            <a:prstDash val="solid"/>
+            <a:headEnd type="none" w="med" len="med"/>
+            <a:tailEnd type="arrow" w="med" len="med"/>
+          </a:ln>
+          <a:effectLst/>
+        </p:spPr>
+        <p:style>
+          <a:lnRef idx="2">
+            <a:schemeClr val="accent1"/>
+          </a:lnRef>
+          <a:fillRef idx="0">
+            <a:schemeClr val="accent1"/>
+          </a:fillRef>
+          <a:effectRef idx="1">
+            <a:schemeClr val="accent1"/>
+          </a:effectRef>
+          <a:fontRef idx="minor">
+            <a:schemeClr val="tx1"/>
+          </a:fontRef>
+        </p:style>
+      </p:cxnSp>
+      <p:sp>
+        <p:nvSpPr>
+          <p:cNvPr id="30" name="Rectangle 29">
+            <a:extLst>
+              <a:ext uri="{FF2B5EF4-FFF2-40B4-BE49-F238E27FC236}">
+                <a16:creationId xmlns:a16="http://schemas.microsoft.com/office/drawing/2014/main" id="{A26C752E-BFFB-4727-B898-4E21D864DD8D}"/>
+              </a:ext>
+            </a:extLst>
+          </p:cNvPr>
+          <p:cNvSpPr/>
+          <p:nvPr/>
+        </p:nvSpPr>
+        <p:spPr>
+          <a:xfrm>
+            <a:off x="6872302" y="2401086"/>
+            <a:ext cx="989137" cy="626780"/>
+          </a:xfrm>
+          <a:prstGeom prst="rect">
+            <a:avLst/>
+          </a:prstGeom>
+          <a:noFill/>
+          <a:ln w="19050">
+            <a:solidFill>
+              <a:schemeClr val="tx1"/>
+            </a:solidFill>
+          </a:ln>
+          <a:effectLst/>
+        </p:spPr>
+        <p:style>
+          <a:lnRef idx="1">
+            <a:schemeClr val="accent1"/>
+          </a:lnRef>
+          <a:fillRef idx="3">
+            <a:schemeClr val="accent1"/>
+          </a:fillRef>
+          <a:effectRef idx="2">
+            <a:schemeClr val="accent1"/>
+          </a:effectRef>
+          <a:fontRef idx="minor">
+            <a:schemeClr val="lt1"/>
+          </a:fontRef>
+        </p:style>
+        <p:txBody>
+          <a:bodyPr rtlCol="0" anchor="ctr"/>
+          <a:lstStyle/>
+          <a:p>
+            <a:pPr algn="ctr"/>
+            <a:r>
+              <a:rPr lang="en-US" sz="1050" dirty="0">
+                <a:solidFill>
+                  <a:schemeClr val="tx1"/>
+                </a:solidFill>
+              </a:rPr>
+              <a:t>Plan Selector</a:t>
+            </a:r>
+          </a:p>
+        </p:txBody>
+      </p:sp>
+      <p:cxnSp>
+        <p:nvCxnSpPr>
+          <p:cNvPr id="31" name="Straight Arrow Connector 30">
+            <a:extLst>
+              <a:ext uri="{FF2B5EF4-FFF2-40B4-BE49-F238E27FC236}">
+                <a16:creationId xmlns:a16="http://schemas.microsoft.com/office/drawing/2014/main" id="{9AFB87D0-77C4-4CB6-BE94-AC6A73EB7C1F}"/>
+              </a:ext>
+            </a:extLst>
+          </p:cNvPr>
+          <p:cNvCxnSpPr>
+            <a:stCxn id="11" idx="3"/>
+            <a:endCxn id="30" idx="1"/>
+          </p:cNvCxnSpPr>
+          <p:nvPr/>
+        </p:nvCxnSpPr>
+        <p:spPr>
+          <a:xfrm>
+            <a:off x="6485459" y="2714478"/>
+            <a:ext cx="386842" cy="0"/>
+          </a:xfrm>
+          <a:prstGeom prst="straightConnector1">
+            <a:avLst/>
+          </a:prstGeom>
+          <a:ln w="19050">
+            <a:solidFill>
+              <a:schemeClr val="tx1"/>
+            </a:solidFill>
+            <a:headEnd type="none" w="med" len="med"/>
+            <a:tailEnd type="arrow" w="med" len="med"/>
+          </a:ln>
+          <a:effectLst/>
+        </p:spPr>
+        <p:style>
+          <a:lnRef idx="2">
+            <a:schemeClr val="accent1"/>
+          </a:lnRef>
+          <a:fillRef idx="0">
+            <a:schemeClr val="accent1"/>
+          </a:fillRef>
+          <a:effectRef idx="1">
+            <a:schemeClr val="accent1"/>
+          </a:effectRef>
+          <a:fontRef idx="minor">
+            <a:schemeClr val="tx1"/>
+          </a:fontRef>
+        </p:style>
+      </p:cxnSp>
+      <p:grpSp>
+        <p:nvGrpSpPr>
+          <p:cNvPr id="32" name="Group 31">
+            <a:extLst>
+              <a:ext uri="{FF2B5EF4-FFF2-40B4-BE49-F238E27FC236}">
+                <a16:creationId xmlns:a16="http://schemas.microsoft.com/office/drawing/2014/main" id="{DE5316F1-495C-4541-A8E2-23A2429AB101}"/>
+              </a:ext>
+            </a:extLst>
+          </p:cNvPr>
+          <p:cNvGrpSpPr/>
+          <p:nvPr/>
+        </p:nvGrpSpPr>
+        <p:grpSpPr>
+          <a:xfrm>
+            <a:off x="4017516" y="2802619"/>
+            <a:ext cx="989137" cy="630020"/>
+            <a:chOff x="4027054" y="2881745"/>
+            <a:chExt cx="932873" cy="594183"/>
+          </a:xfrm>
+        </p:grpSpPr>
+        <p:sp>
+          <p:nvSpPr>
+            <p:cNvPr id="50" name="Rectangle 49">
+              <a:extLst>
+                <a:ext uri="{FF2B5EF4-FFF2-40B4-BE49-F238E27FC236}">
+                  <a16:creationId xmlns:a16="http://schemas.microsoft.com/office/drawing/2014/main" id="{0729F763-1ED9-458E-BA62-5BB72E1EA402}"/>
+                </a:ext>
+              </a:extLst>
+            </p:cNvPr>
+            <p:cNvSpPr/>
+            <p:nvPr/>
+          </p:nvSpPr>
+          <p:spPr>
+            <a:xfrm>
+              <a:off x="4027054" y="2881745"/>
+              <a:ext cx="932873" cy="591127"/>
+            </a:xfrm>
+            <a:prstGeom prst="rect">
+              <a:avLst/>
+            </a:prstGeom>
+            <a:noFill/>
+            <a:ln w="19050">
+              <a:solidFill>
+                <a:schemeClr val="tx1"/>
+              </a:solidFill>
+            </a:ln>
+            <a:effectLst/>
+          </p:spPr>
+          <p:style>
+            <a:lnRef idx="1">
+              <a:schemeClr val="accent1"/>
+            </a:lnRef>
+            <a:fillRef idx="3">
+              <a:schemeClr val="accent1"/>
+            </a:fillRef>
+            <a:effectRef idx="2">
+              <a:schemeClr val="accent1"/>
+            </a:effectRef>
+            <a:fontRef idx="minor">
+              <a:schemeClr val="lt1"/>
+            </a:fontRef>
+          </p:style>
+          <p:txBody>
+            <a:bodyPr rtlCol="0" anchor="ctr"/>
+            <a:lstStyle/>
+            <a:p>
+              <a:pPr algn="ctr"/>
+              <a:r>
+                <a:rPr lang="en-US" sz="1050" dirty="0">
+                  <a:solidFill>
+                    <a:schemeClr val="tx1"/>
+                  </a:solidFill>
+                </a:rPr>
+                <a:t>Own ship</a:t>
+              </a:r>
+            </a:p>
+            <a:p>
+              <a:pPr algn="ctr"/>
+              <a:r>
+                <a:rPr lang="en-US" sz="1050" dirty="0">
+                  <a:solidFill>
+                    <a:schemeClr val="tx1"/>
+                  </a:solidFill>
+                </a:rPr>
+                <a:t>Trajectory Prediction</a:t>
+              </a:r>
+            </a:p>
+          </p:txBody>
+        </p:sp>
+        <p:sp>
+          <p:nvSpPr>
+            <p:cNvPr id="51" name="Rectangle 50">
+              <a:extLst>
+                <a:ext uri="{FF2B5EF4-FFF2-40B4-BE49-F238E27FC236}">
+                  <a16:creationId xmlns:a16="http://schemas.microsoft.com/office/drawing/2014/main" id="{F6E0E3AF-3944-47A0-A141-9A43354A9E21}"/>
+                </a:ext>
+              </a:extLst>
+            </p:cNvPr>
+            <p:cNvSpPr/>
+            <p:nvPr/>
+          </p:nvSpPr>
+          <p:spPr>
+            <a:xfrm>
+              <a:off x="4562761" y="3279879"/>
+              <a:ext cx="198584" cy="196049"/>
+            </a:xfrm>
+            <a:prstGeom prst="rect">
+              <a:avLst/>
+            </a:prstGeom>
+            <a:noFill/>
+            <a:ln>
+              <a:noFill/>
+            </a:ln>
+            <a:effectLst/>
+          </p:spPr>
+          <p:style>
+            <a:lnRef idx="1">
+              <a:schemeClr val="accent1"/>
+            </a:lnRef>
+            <a:fillRef idx="3">
+              <a:schemeClr val="accent1"/>
+            </a:fillRef>
+            <a:effectRef idx="2">
+              <a:schemeClr val="accent1"/>
+            </a:effectRef>
+            <a:fontRef idx="minor">
+              <a:schemeClr val="lt1"/>
+            </a:fontRef>
+          </p:style>
+          <p:txBody>
+            <a:bodyPr rtlCol="0" anchor="ctr"/>
+            <a:lstStyle/>
+            <a:p>
+              <a:pPr algn="ctr"/>
+              <a:endParaRPr lang="en-US" sz="1400"/>
+            </a:p>
+          </p:txBody>
+        </p:sp>
+        <p:sp>
+          <p:nvSpPr>
+            <p:cNvPr id="52" name="Rectangle 51">
+              <a:extLst>
+                <a:ext uri="{FF2B5EF4-FFF2-40B4-BE49-F238E27FC236}">
+                  <a16:creationId xmlns:a16="http://schemas.microsoft.com/office/drawing/2014/main" id="{448AE298-248C-49B8-B4F7-97B100051BD8}"/>
+                </a:ext>
+              </a:extLst>
+            </p:cNvPr>
+            <p:cNvSpPr/>
+            <p:nvPr/>
+          </p:nvSpPr>
+          <p:spPr>
+            <a:xfrm>
+              <a:off x="4225633" y="3266540"/>
+              <a:ext cx="198584" cy="196049"/>
+            </a:xfrm>
+            <a:prstGeom prst="rect">
+              <a:avLst/>
+            </a:prstGeom>
+            <a:noFill/>
+            <a:ln>
+              <a:noFill/>
+            </a:ln>
+            <a:effectLst/>
+          </p:spPr>
+          <p:style>
+            <a:lnRef idx="1">
+              <a:schemeClr val="accent1"/>
+            </a:lnRef>
+            <a:fillRef idx="3">
+              <a:schemeClr val="accent1"/>
+            </a:fillRef>
+            <a:effectRef idx="2">
+              <a:schemeClr val="accent1"/>
+            </a:effectRef>
+            <a:fontRef idx="minor">
+              <a:schemeClr val="lt1"/>
+            </a:fontRef>
+          </p:style>
+          <p:txBody>
+            <a:bodyPr rtlCol="0" anchor="ctr"/>
+            <a:lstStyle/>
+            <a:p>
+              <a:pPr algn="ctr"/>
+              <a:endParaRPr lang="en-US" sz="1400"/>
+            </a:p>
+          </p:txBody>
+        </p:sp>
+      </p:grpSp>
+      <p:cxnSp>
+        <p:nvCxnSpPr>
+          <p:cNvPr id="36" name="Straight Arrow Connector 35">
+            <a:extLst>
+              <a:ext uri="{FF2B5EF4-FFF2-40B4-BE49-F238E27FC236}">
+                <a16:creationId xmlns:a16="http://schemas.microsoft.com/office/drawing/2014/main" id="{EC8F3A72-613F-46FF-82A8-F21DA3717FF3}"/>
+              </a:ext>
+            </a:extLst>
+          </p:cNvPr>
+          <p:cNvCxnSpPr>
+            <a:cxnSpLocks/>
+            <a:stCxn id="30" idx="2"/>
+            <a:endCxn id="47" idx="0"/>
+          </p:cNvCxnSpPr>
+          <p:nvPr/>
+        </p:nvCxnSpPr>
+        <p:spPr>
+          <a:xfrm>
+            <a:off x="7366871" y="3027866"/>
+            <a:ext cx="4383" cy="1031330"/>
+          </a:xfrm>
+          <a:prstGeom prst="straightConnector1">
+            <a:avLst/>
+          </a:prstGeom>
+          <a:ln w="19050">
+            <a:solidFill>
+              <a:schemeClr val="tx1"/>
+            </a:solidFill>
+            <a:headEnd type="none" w="med" len="med"/>
+            <a:tailEnd type="arrow" w="med" len="med"/>
+          </a:ln>
+          <a:effectLst/>
+        </p:spPr>
+        <p:style>
+          <a:lnRef idx="2">
+            <a:schemeClr val="accent1"/>
+          </a:lnRef>
+          <a:fillRef idx="0">
+            <a:schemeClr val="accent1"/>
+          </a:fillRef>
+          <a:effectRef idx="1">
+            <a:schemeClr val="accent1"/>
+          </a:effectRef>
+          <a:fontRef idx="minor">
+            <a:schemeClr val="tx1"/>
+          </a:fontRef>
+        </p:style>
+      </p:cxnSp>
+      <p:sp>
+        <p:nvSpPr>
+          <p:cNvPr id="37" name="TextBox 36">
+            <a:extLst>
+              <a:ext uri="{FF2B5EF4-FFF2-40B4-BE49-F238E27FC236}">
+                <a16:creationId xmlns:a16="http://schemas.microsoft.com/office/drawing/2014/main" id="{AEC97773-D2EA-4CB8-8867-680C7EB51AE0}"/>
+              </a:ext>
+            </a:extLst>
+          </p:cNvPr>
+          <p:cNvSpPr txBox="1"/>
+          <p:nvPr/>
+        </p:nvSpPr>
+        <p:spPr>
+          <a:xfrm>
+            <a:off x="7347570" y="3038455"/>
+            <a:ext cx="444352" cy="338554"/>
+          </a:xfrm>
+          <a:prstGeom prst="rect">
+            <a:avLst/>
+          </a:prstGeom>
+          <a:noFill/>
+        </p:spPr>
+        <p:txBody>
+          <a:bodyPr wrap="none" rtlCol="0">
+            <a:spAutoFit/>
+          </a:bodyPr>
+          <a:lstStyle/>
+          <a:p>
+            <a:pPr algn="l"/>
+            <a:r>
+              <a:rPr lang="en-US" sz="800" dirty="0">
+                <a:cs typeface="Arial" panose="020B0604020202020204" pitchFamily="34" charset="0"/>
+              </a:rPr>
+              <a:t>LEC or</a:t>
+            </a:r>
+          </a:p>
+          <a:p>
+            <a:pPr algn="l"/>
+            <a:r>
+              <a:rPr lang="en-US" sz="800" dirty="0">
+                <a:cs typeface="Arial" panose="020B0604020202020204" pitchFamily="34" charset="0"/>
+              </a:rPr>
+              <a:t>BAP</a:t>
+            </a:r>
+          </a:p>
+        </p:txBody>
+      </p:sp>
+      <p:cxnSp>
+        <p:nvCxnSpPr>
+          <p:cNvPr id="78" name="Elbow Connector 15">
+            <a:extLst>
+              <a:ext uri="{FF2B5EF4-FFF2-40B4-BE49-F238E27FC236}">
+                <a16:creationId xmlns:a16="http://schemas.microsoft.com/office/drawing/2014/main" id="{269FAF1D-9B7B-43C5-82A9-1E95070872CA}"/>
+              </a:ext>
+            </a:extLst>
+          </p:cNvPr>
+          <p:cNvCxnSpPr>
+            <a:cxnSpLocks/>
+            <a:stCxn id="50" idx="3"/>
+          </p:cNvCxnSpPr>
+          <p:nvPr/>
+        </p:nvCxnSpPr>
+        <p:spPr>
+          <a:xfrm flipV="1">
+            <a:off x="5006653" y="2924928"/>
+            <a:ext cx="494923" cy="191081"/>
+          </a:xfrm>
+          <a:prstGeom prst="bentConnector3">
+            <a:avLst>
+              <a:gd name="adj1" fmla="val 50000"/>
+            </a:avLst>
+          </a:prstGeom>
+          <a:ln w="19050">
+            <a:solidFill>
+              <a:schemeClr val="tx1"/>
+            </a:solidFill>
+            <a:headEnd type="none" w="med" len="med"/>
+            <a:tailEnd type="arrow" w="med" len="med"/>
+          </a:ln>
+          <a:effectLst/>
+        </p:spPr>
+        <p:style>
+          <a:lnRef idx="2">
+            <a:schemeClr val="accent1"/>
+          </a:lnRef>
+          <a:fillRef idx="0">
+            <a:schemeClr val="accent1"/>
+          </a:fillRef>
+          <a:effectRef idx="1">
+            <a:schemeClr val="accent1"/>
+          </a:effectRef>
+          <a:fontRef idx="minor">
+            <a:schemeClr val="tx1"/>
+          </a:fontRef>
+        </p:style>
+      </p:cxnSp>
+      <p:cxnSp>
+        <p:nvCxnSpPr>
+          <p:cNvPr id="65" name="Elbow Connector 30">
+            <a:extLst>
+              <a:ext uri="{FF2B5EF4-FFF2-40B4-BE49-F238E27FC236}">
+                <a16:creationId xmlns:a16="http://schemas.microsoft.com/office/drawing/2014/main" id="{A1A8F167-4DF8-49A6-A243-9EAECBED5B6D}"/>
+              </a:ext>
+            </a:extLst>
+          </p:cNvPr>
+          <p:cNvCxnSpPr>
+            <a:cxnSpLocks/>
+            <a:stCxn id="17" idx="0"/>
+            <a:endCxn id="42" idx="0"/>
+          </p:cNvCxnSpPr>
+          <p:nvPr/>
+        </p:nvCxnSpPr>
+        <p:spPr>
+          <a:xfrm rot="16200000" flipH="1" flipV="1">
+            <a:off x="6287219" y="-87561"/>
+            <a:ext cx="673745" cy="8971942"/>
+          </a:xfrm>
+          <a:prstGeom prst="bentConnector3">
+            <a:avLst>
+              <a:gd name="adj1" fmla="val -47810"/>
+            </a:avLst>
+          </a:prstGeom>
+          <a:ln w="19050">
+            <a:solidFill>
+              <a:schemeClr val="tx1"/>
+            </a:solidFill>
+            <a:headEnd type="none" w="med" len="med"/>
+            <a:tailEnd type="arrow" w="med" len="med"/>
+          </a:ln>
+          <a:effectLst/>
+        </p:spPr>
+        <p:style>
+          <a:lnRef idx="2">
+            <a:schemeClr val="accent1"/>
+          </a:lnRef>
+          <a:fillRef idx="0">
+            <a:schemeClr val="accent1"/>
+          </a:fillRef>
+          <a:effectRef idx="1">
+            <a:schemeClr val="accent1"/>
+          </a:effectRef>
+          <a:fontRef idx="minor">
+            <a:schemeClr val="tx1"/>
+          </a:fontRef>
+        </p:style>
+      </p:cxnSp>
+    </p:spTree>
+    <p:extLst>
+      <p:ext uri="{BB962C8B-B14F-4D97-AF65-F5344CB8AC3E}">
+        <p14:creationId xmlns:p14="http://schemas.microsoft.com/office/powerpoint/2010/main" val="2267995398"/>
+      </p:ext>
+    </p:extLst>
+  </p:cSld>
+  <p:clrMapOvr>
+    <a:masterClrMapping/>
+  </p:clrMapOvr>
+</p:sld>
+</file>
+
+<file path=ppt/slides/slide3.xml><?xml version="1.0" encoding="utf-8"?>
+<p:sld xmlns:a="http://schemas.openxmlformats.org/drawingml/2006/main" xmlns:r="http://schemas.openxmlformats.org/officeDocument/2006/relationships" xmlns:p="http://schemas.openxmlformats.org/presentationml/2006/main">
+  <p:cSld>
+    <p:spTree>
+      <p:nvGrpSpPr>
+        <p:cNvPr id="1" name=""/>
+        <p:cNvGrpSpPr/>
+        <p:nvPr/>
+      </p:nvGrpSpPr>
+      <p:grpSpPr>
+        <a:xfrm>
+          <a:off x="0" y="0"/>
+          <a:ext cx="0" cy="0"/>
+          <a:chOff x="0" y="0"/>
+          <a:chExt cx="0" cy="0"/>
+        </a:xfrm>
+      </p:grpSpPr>
       <p:grpSp>
         <p:nvGrpSpPr>
           <p:cNvPr id="27" name="Group 26">
@@ -7626,7 +9913,7 @@
 </p:sld>
 </file>
 
-<file path=ppt/slides/slide3.xml><?xml version="1.0" encoding="utf-8"?>
+<file path=ppt/slides/slide4.xml><?xml version="1.0" encoding="utf-8"?>
 <p:sld xmlns:a="http://schemas.openxmlformats.org/drawingml/2006/main" xmlns:r="http://schemas.openxmlformats.org/officeDocument/2006/relationships" xmlns:p="http://schemas.openxmlformats.org/presentationml/2006/main">
   <p:cSld>
     <p:spTree>
@@ -8680,7 +10967,7 @@
 </p:sld>
 </file>
 
-<file path=ppt/slides/slide4.xml><?xml version="1.0" encoding="utf-8"?>
+<file path=ppt/slides/slide5.xml><?xml version="1.0" encoding="utf-8"?>
 <p:sld xmlns:a="http://schemas.openxmlformats.org/drawingml/2006/main" xmlns:r="http://schemas.openxmlformats.org/officeDocument/2006/relationships" xmlns:p="http://schemas.openxmlformats.org/presentationml/2006/main">
   <p:cSld>
     <p:spTree>

</xml_diff>